<commit_message>
/ ‘sse/index.html’ / ‘sse/postfix/mailfilter-pt1.rtf’ / ‘sse/postfix/mailfilter-pt2.pptx’ / ‘sse/postfix/mailfilter-pt3.rtf’ < ‘sse/postfix/postfix-preso-debian.pptx’ > ‘sse/postfix/postfix-mailgateway-debian.ppt’ + ‘sse/postfix/postfix-mailgateway-debian.pptx’
</commit_message>
<xml_diff>
--- a/sse/postfix/mailfilter-pt2.pptx
+++ b/sse/postfix/mailfilter-pt2.pptx
@@ -299,7 +299,7 @@
           <a:p>
             <a:fld id="{03950108-52B0-2342-B9DD-68BFB658BDA7}" type="datetimeFigureOut">
               <a:rPr lang="en-US" smtClean="0"/>
-              <a:t>5/27/15</a:t>
+              <a:t>5/28/15</a:t>
             </a:fld>
             <a:endParaRPr lang="en-US"/>
           </a:p>
@@ -469,7 +469,7 @@
           <a:p>
             <a:fld id="{03950108-52B0-2342-B9DD-68BFB658BDA7}" type="datetimeFigureOut">
               <a:rPr lang="en-US" smtClean="0"/>
-              <a:t>5/27/15</a:t>
+              <a:t>5/28/15</a:t>
             </a:fld>
             <a:endParaRPr lang="en-US"/>
           </a:p>
@@ -649,7 +649,7 @@
           <a:p>
             <a:fld id="{03950108-52B0-2342-B9DD-68BFB658BDA7}" type="datetimeFigureOut">
               <a:rPr lang="en-US" smtClean="0"/>
-              <a:t>5/27/15</a:t>
+              <a:t>5/28/15</a:t>
             </a:fld>
             <a:endParaRPr lang="en-US"/>
           </a:p>
@@ -819,7 +819,7 @@
           <a:p>
             <a:fld id="{03950108-52B0-2342-B9DD-68BFB658BDA7}" type="datetimeFigureOut">
               <a:rPr lang="en-US" smtClean="0"/>
-              <a:t>5/27/15</a:t>
+              <a:t>5/28/15</a:t>
             </a:fld>
             <a:endParaRPr lang="en-US"/>
           </a:p>
@@ -1065,7 +1065,7 @@
           <a:p>
             <a:fld id="{03950108-52B0-2342-B9DD-68BFB658BDA7}" type="datetimeFigureOut">
               <a:rPr lang="en-US" smtClean="0"/>
-              <a:t>5/27/15</a:t>
+              <a:t>5/28/15</a:t>
             </a:fld>
             <a:endParaRPr lang="en-US"/>
           </a:p>
@@ -1353,7 +1353,7 @@
           <a:p>
             <a:fld id="{03950108-52B0-2342-B9DD-68BFB658BDA7}" type="datetimeFigureOut">
               <a:rPr lang="en-US" smtClean="0"/>
-              <a:t>5/27/15</a:t>
+              <a:t>5/28/15</a:t>
             </a:fld>
             <a:endParaRPr lang="en-US"/>
           </a:p>
@@ -1775,7 +1775,7 @@
           <a:p>
             <a:fld id="{03950108-52B0-2342-B9DD-68BFB658BDA7}" type="datetimeFigureOut">
               <a:rPr lang="en-US" smtClean="0"/>
-              <a:t>5/27/15</a:t>
+              <a:t>5/28/15</a:t>
             </a:fld>
             <a:endParaRPr lang="en-US"/>
           </a:p>
@@ -1893,7 +1893,7 @@
           <a:p>
             <a:fld id="{03950108-52B0-2342-B9DD-68BFB658BDA7}" type="datetimeFigureOut">
               <a:rPr lang="en-US" smtClean="0"/>
-              <a:t>5/27/15</a:t>
+              <a:t>5/28/15</a:t>
             </a:fld>
             <a:endParaRPr lang="en-US"/>
           </a:p>
@@ -1988,7 +1988,7 @@
           <a:p>
             <a:fld id="{03950108-52B0-2342-B9DD-68BFB658BDA7}" type="datetimeFigureOut">
               <a:rPr lang="en-US" smtClean="0"/>
-              <a:t>5/27/15</a:t>
+              <a:t>5/28/15</a:t>
             </a:fld>
             <a:endParaRPr lang="en-US"/>
           </a:p>
@@ -2265,7 +2265,7 @@
           <a:p>
             <a:fld id="{03950108-52B0-2342-B9DD-68BFB658BDA7}" type="datetimeFigureOut">
               <a:rPr lang="en-US" smtClean="0"/>
-              <a:t>5/27/15</a:t>
+              <a:t>5/28/15</a:t>
             </a:fld>
             <a:endParaRPr lang="en-US"/>
           </a:p>
@@ -2518,7 +2518,7 @@
           <a:p>
             <a:fld id="{03950108-52B0-2342-B9DD-68BFB658BDA7}" type="datetimeFigureOut">
               <a:rPr lang="en-US" smtClean="0"/>
-              <a:t>5/27/15</a:t>
+              <a:t>5/28/15</a:t>
             </a:fld>
             <a:endParaRPr lang="en-US"/>
           </a:p>
@@ -2731,7 +2731,7 @@
           <a:p>
             <a:fld id="{03950108-52B0-2342-B9DD-68BFB658BDA7}" type="datetimeFigureOut">
               <a:rPr lang="en-US" smtClean="0"/>
-              <a:t>5/27/15</a:t>
+              <a:t>5/28/15</a:t>
             </a:fld>
             <a:endParaRPr lang="en-US"/>
           </a:p>
@@ -3122,35 +3122,35 @@
           <a:lstStyle/>
           <a:p>
             <a:r>
-              <a:rPr lang="en-US" b="1" dirty="0" err="1" smtClean="0"/>
+              <a:rPr lang="en-US" b="1" dirty="0" smtClean="0"/>
+              <a:t>Mail Gateway – Part 2</a:t>
+            </a:r>
+            <a:endParaRPr lang="en-US" b="1" dirty="0"/>
+          </a:p>
+        </p:txBody>
+      </p:sp>
+      <p:sp>
+        <p:nvSpPr>
+          <p:cNvPr id="3" name="Subtitle 2"/>
+          <p:cNvSpPr>
+            <a:spLocks noGrp="1"/>
+          </p:cNvSpPr>
+          <p:nvPr>
+            <p:ph type="subTitle" idx="1"/>
+          </p:nvPr>
+        </p:nvSpPr>
+        <p:spPr/>
+        <p:txBody>
+          <a:bodyPr/>
+          <a:lstStyle/>
+          <a:p>
+            <a:r>
+              <a:rPr lang="en-US" b="1" dirty="0" err="1"/>
               <a:t>MailScanner</a:t>
             </a:r>
             <a:r>
-              <a:rPr lang="en-US" b="1" dirty="0" smtClean="0"/>
+              <a:rPr lang="en-US" b="1" dirty="0"/>
               <a:t> Installation</a:t>
-            </a:r>
-            <a:endParaRPr lang="en-US" b="1" dirty="0"/>
-          </a:p>
-        </p:txBody>
-      </p:sp>
-      <p:sp>
-        <p:nvSpPr>
-          <p:cNvPr id="3" name="Subtitle 2"/>
-          <p:cNvSpPr>
-            <a:spLocks noGrp="1"/>
-          </p:cNvSpPr>
-          <p:nvPr>
-            <p:ph type="subTitle" idx="1"/>
-          </p:nvPr>
-        </p:nvSpPr>
-        <p:spPr/>
-        <p:txBody>
-          <a:bodyPr/>
-          <a:lstStyle/>
-          <a:p>
-            <a:r>
-              <a:rPr lang="en-US" b="1" dirty="0" smtClean="0"/>
-              <a:t>Part 2</a:t>
             </a:r>
             <a:endParaRPr lang="en-US" b="1" dirty="0"/>
           </a:p>
@@ -3536,7 +3536,15 @@
           <a:p>
             <a:r>
               <a:rPr lang="en-US" b="1" dirty="0" smtClean="0"/>
-              <a:t>After you run</a:t>
+              <a:t>After you </a:t>
+            </a:r>
+            <a:r>
+              <a:rPr lang="en-US" b="1" dirty="0" smtClean="0"/>
+              <a:t>run ./</a:t>
+            </a:r>
+            <a:r>
+              <a:rPr lang="en-US" b="1" dirty="0" err="1" smtClean="0"/>
+              <a:t>install.sh</a:t>
             </a:r>
             <a:endParaRPr lang="en-US" b="1" dirty="0"/>
           </a:p>

</xml_diff>

<commit_message>
/ ‘sse/postfix/mailfilter-pt1.rtf’ / ‘sse/postfix/mailfilter-pt2.pptx’
</commit_message>
<xml_diff>
--- a/sse/postfix/mailfilter-pt2.pptx
+++ b/sse/postfix/mailfilter-pt2.pptx
@@ -3152,7 +3152,6 @@
               <a:rPr lang="en-US" b="1" dirty="0"/>
               <a:t> Installation</a:t>
             </a:r>
-            <a:endParaRPr lang="en-US" b="1" dirty="0"/>
           </a:p>
         </p:txBody>
       </p:sp>
@@ -3202,8 +3201,16 @@
           <a:lstStyle/>
           <a:p>
             <a:r>
+              <a:rPr lang="en-US" b="1" smtClean="0"/>
+              <a:t>Enter </a:t>
+            </a:r>
+            <a:r>
+              <a:rPr lang="en-US" b="1" smtClean="0"/>
+              <a:t>your </a:t>
+            </a:r>
+            <a:r>
               <a:rPr lang="en-US" b="1" dirty="0" smtClean="0"/>
-              <a:t>Enter your PC Name</a:t>
+              <a:t>Name</a:t>
             </a:r>
             <a:endParaRPr lang="en-US" b="1" dirty="0"/>
           </a:p>
@@ -3239,6 +3246,107 @@
           </a:prstGeom>
         </p:spPr>
       </p:pic>
+      <p:sp>
+        <p:nvSpPr>
+          <p:cNvPr id="3" name="TextBox 2"/>
+          <p:cNvSpPr txBox="1"/>
+          <p:nvPr/>
+        </p:nvSpPr>
+        <p:spPr>
+          <a:xfrm>
+            <a:off x="2938212" y="1933700"/>
+            <a:ext cx="184666" cy="369332"/>
+          </a:xfrm>
+          <a:prstGeom prst="rect">
+            <a:avLst/>
+          </a:prstGeom>
+          <a:noFill/>
+        </p:spPr>
+        <p:txBody>
+          <a:bodyPr wrap="none" rtlCol="0">
+            <a:spAutoFit/>
+          </a:bodyPr>
+          <a:lstStyle/>
+          <a:p>
+            <a:endParaRPr lang="en-US"/>
+          </a:p>
+        </p:txBody>
+      </p:sp>
+      <p:sp>
+        <p:nvSpPr>
+          <p:cNvPr id="5" name="TextBox 4"/>
+          <p:cNvSpPr txBox="1"/>
+          <p:nvPr/>
+        </p:nvSpPr>
+        <p:spPr>
+          <a:xfrm>
+            <a:off x="2108179" y="1904674"/>
+            <a:ext cx="4693057" cy="584776"/>
+          </a:xfrm>
+          <a:prstGeom prst="rect">
+            <a:avLst/>
+          </a:prstGeom>
+          <a:noFill/>
+        </p:spPr>
+        <p:txBody>
+          <a:bodyPr wrap="square" rtlCol="0">
+            <a:spAutoFit/>
+          </a:bodyPr>
+          <a:lstStyle/>
+          <a:p>
+            <a:r>
+              <a:rPr lang="en-US" sz="3200" b="1" dirty="0" err="1"/>
+              <a:t>y</a:t>
+            </a:r>
+            <a:r>
+              <a:rPr lang="en-US" sz="3200" b="1" dirty="0" err="1" smtClean="0"/>
+              <a:t>ourname.afnog.guru</a:t>
+            </a:r>
+            <a:endParaRPr lang="en-US" sz="3200" b="1" dirty="0"/>
+          </a:p>
+        </p:txBody>
+      </p:sp>
+      <p:sp>
+        <p:nvSpPr>
+          <p:cNvPr id="6" name="Rectangle 5"/>
+          <p:cNvSpPr/>
+          <p:nvPr/>
+        </p:nvSpPr>
+        <p:spPr>
+          <a:xfrm>
+            <a:off x="853029" y="5270281"/>
+            <a:ext cx="3260468" cy="436030"/>
+          </a:xfrm>
+          <a:prstGeom prst="rect">
+            <a:avLst/>
+          </a:prstGeom>
+        </p:spPr>
+        <p:style>
+          <a:lnRef idx="1">
+            <a:schemeClr val="accent1"/>
+          </a:lnRef>
+          <a:fillRef idx="3">
+            <a:schemeClr val="accent1"/>
+          </a:fillRef>
+          <a:effectRef idx="2">
+            <a:schemeClr val="accent1"/>
+          </a:effectRef>
+          <a:fontRef idx="minor">
+            <a:schemeClr val="lt1"/>
+          </a:fontRef>
+        </p:style>
+        <p:txBody>
+          <a:bodyPr rtlCol="0" anchor="ctr"/>
+          <a:lstStyle/>
+          <a:p>
+            <a:r>
+              <a:rPr lang="en-US" sz="2000" b="1" dirty="0" err="1"/>
+              <a:t>yourname.afnog.guru</a:t>
+            </a:r>
+            <a:endParaRPr lang="en-US" sz="2000" b="1" dirty="0"/>
+          </a:p>
+        </p:txBody>
+      </p:sp>
     </p:spTree>
     <p:extLst>
       <p:ext uri="{BB962C8B-B14F-4D97-AF65-F5344CB8AC3E}">
@@ -3536,11 +3644,7 @@
           <a:p>
             <a:r>
               <a:rPr lang="en-US" b="1" dirty="0" smtClean="0"/>
-              <a:t>After you </a:t>
-            </a:r>
-            <a:r>
-              <a:rPr lang="en-US" b="1" dirty="0" smtClean="0"/>
-              <a:t>run ./</a:t>
+              <a:t>After you run ./</a:t>
             </a:r>
             <a:r>
               <a:rPr lang="en-US" b="1" dirty="0" err="1" smtClean="0"/>

</xml_diff>